<commit_message>
Struktur der Präsi gemacht muss noch ausgefüllt werden
</commit_message>
<xml_diff>
--- a/Präsentationen/Zwischen_Präse/Chessmaster_Zwischenpräsentation.pptx
+++ b/Präsentationen/Zwischen_Präse/Chessmaster_Zwischenpräsentation.pptx
@@ -122,6 +122,49 @@
     </a:lvl9pPr>
   </p:defaultTextStyle>
   <p:extLst>
+    <p:ext uri="{521415D9-36F7-43E2-AB2F-B90AF26B5E84}">
+      <p14:sectionLst xmlns:p14="http://schemas.microsoft.com/office/powerpoint/2010/main">
+        <p14:section name="Start" id="{15E0E3E4-1B48-43F2-8791-09A2D4C2FC9E}">
+          <p14:sldIdLst>
+            <p14:sldId id="256"/>
+            <p14:sldId id="267"/>
+          </p14:sldIdLst>
+        </p14:section>
+        <p14:section name="Motivation" id="{F974A243-E6A0-46C9-88B4-A5B3BBAD436E}">
+          <p14:sldIdLst>
+            <p14:sldId id="258"/>
+            <p14:sldId id="262"/>
+          </p14:sldIdLst>
+        </p14:section>
+        <p14:section name="State of the Art" id="{94456F12-F98C-4B4F-B691-44AC85B61CE8}">
+          <p14:sldIdLst>
+            <p14:sldId id="259"/>
+            <p14:sldId id="265"/>
+            <p14:sldId id="264"/>
+            <p14:sldId id="266"/>
+          </p14:sldIdLst>
+        </p14:section>
+        <p14:section name="Algortihm" id="{49C9509F-5D63-4684-A812-16C034F1545C}">
+          <p14:sldIdLst>
+            <p14:sldId id="260"/>
+            <p14:sldId id="263"/>
+            <p14:sldId id="269"/>
+          </p14:sldIdLst>
+        </p14:section>
+        <p14:section name="Procedure" id="{128E0E20-0C0B-4820-8B11-63DFF24C021F}">
+          <p14:sldIdLst>
+            <p14:sldId id="261"/>
+            <p14:sldId id="270"/>
+          </p14:sldIdLst>
+        </p14:section>
+        <p14:section name="The End" id="{6C69CB28-6A81-4AC7-85DC-FB77774593A8}">
+          <p14:sldIdLst>
+            <p14:sldId id="272"/>
+            <p14:sldId id="271"/>
+          </p14:sldIdLst>
+        </p14:section>
+      </p14:sectionLst>
+    </p:ext>
     <p:ext uri="{EFAFB233-063F-42B5-8137-9DF3F51BA10A}">
       <p15:sldGuideLst xmlns:p15="http://schemas.microsoft.com/office/powerpoint/2012/main">
         <p15:guide id="1" orient="horz" pos="2160" userDrawn="1">
@@ -146,7 +189,7 @@
 <file path=ppt/revisionInfo.xml><?xml version="1.0" encoding="utf-8"?>
 <p1510:revInfo xmlns:a="http://schemas.openxmlformats.org/drawingml/2006/main" xmlns:r="http://schemas.openxmlformats.org/officeDocument/2006/relationships" xmlns:p1510="http://schemas.microsoft.com/office/powerpoint/2015/10/main">
   <p1510:revLst>
-    <p1510:client id="{E7A5B079-1BA6-4760-B851-727E3DF33BC4}" v="107" dt="2020-05-31T22:23:59.291"/>
+    <p1510:client id="{E7A5B079-1BA6-4760-B851-727E3DF33BC4}" v="123" dt="2020-05-31T22:33:40.741"/>
   </p1510:revLst>
 </p1510:revInfo>
 </file>
@@ -156,16 +199,24 @@
   <pc:docChgLst>
     <pc:chgData name="Thorsten Hilbradt" userId="b76ca37a-0758-4f71-aeb6-b277b8bbbfdd" providerId="ADAL" clId="{E7A5B079-1BA6-4760-B851-727E3DF33BC4}"/>
     <pc:docChg chg="undo custSel mod addSld delSld modSld sldOrd">
-      <pc:chgData name="Thorsten Hilbradt" userId="b76ca37a-0758-4f71-aeb6-b277b8bbbfdd" providerId="ADAL" clId="{E7A5B079-1BA6-4760-B851-727E3DF33BC4}" dt="2020-05-31T22:25:26.698" v="1264" actId="20577"/>
+      <pc:chgData name="Thorsten Hilbradt" userId="b76ca37a-0758-4f71-aeb6-b277b8bbbfdd" providerId="ADAL" clId="{E7A5B079-1BA6-4760-B851-727E3DF33BC4}" dt="2020-05-31T22:41:10.533" v="1351" actId="478"/>
       <pc:docMkLst>
         <pc:docMk/>
       </pc:docMkLst>
-      <pc:sldChg chg="addSp delSp delDesignElem">
-        <pc:chgData name="Thorsten Hilbradt" userId="b76ca37a-0758-4f71-aeb6-b277b8bbbfdd" providerId="ADAL" clId="{E7A5B079-1BA6-4760-B851-727E3DF33BC4}" dt="2020-05-29T07:53:35.752" v="27"/>
+      <pc:sldChg chg="addSp delSp modSp delDesignElem">
+        <pc:chgData name="Thorsten Hilbradt" userId="b76ca37a-0758-4f71-aeb6-b277b8bbbfdd" providerId="ADAL" clId="{E7A5B079-1BA6-4760-B851-727E3DF33BC4}" dt="2020-05-31T22:28:35.222" v="1298" actId="20577"/>
         <pc:sldMkLst>
           <pc:docMk/>
           <pc:sldMk cId="3447223317" sldId="256"/>
         </pc:sldMkLst>
+        <pc:spChg chg="mod">
+          <ac:chgData name="Thorsten Hilbradt" userId="b76ca37a-0758-4f71-aeb6-b277b8bbbfdd" providerId="ADAL" clId="{E7A5B079-1BA6-4760-B851-727E3DF33BC4}" dt="2020-05-31T22:28:35.222" v="1298" actId="20577"/>
+          <ac:spMkLst>
+            <pc:docMk/>
+            <pc:sldMk cId="3447223317" sldId="256"/>
+            <ac:spMk id="3" creationId="{B0363669-611E-4845-9C4F-7A73771836A4}"/>
+          </ac:spMkLst>
+        </pc:spChg>
         <pc:spChg chg="add del">
           <ac:chgData name="Thorsten Hilbradt" userId="b76ca37a-0758-4f71-aeb6-b277b8bbbfdd" providerId="ADAL" clId="{E7A5B079-1BA6-4760-B851-727E3DF33BC4}" dt="2020-05-29T07:53:35.752" v="27"/>
           <ac:spMkLst>
@@ -943,7 +994,7 @@
         </pc:spChg>
       </pc:sldChg>
       <pc:sldChg chg="addSp delSp modSp add mod ord setBg">
-        <pc:chgData name="Thorsten Hilbradt" userId="b76ca37a-0758-4f71-aeb6-b277b8bbbfdd" providerId="ADAL" clId="{E7A5B079-1BA6-4760-B851-727E3DF33BC4}" dt="2020-05-31T22:17:25.851" v="1052"/>
+        <pc:chgData name="Thorsten Hilbradt" userId="b76ca37a-0758-4f71-aeb6-b277b8bbbfdd" providerId="ADAL" clId="{E7A5B079-1BA6-4760-B851-727E3DF33BC4}" dt="2020-05-31T22:41:10.533" v="1351" actId="478"/>
         <pc:sldMkLst>
           <pc:docMk/>
           <pc:sldMk cId="3503204803" sldId="263"/>
@@ -1084,6 +1135,22 @@
             <ac:spMk id="34" creationId="{B4F5FA0D-0104-4987-8241-EFF7C85B88DE}"/>
           </ac:spMkLst>
         </pc:spChg>
+        <pc:graphicFrameChg chg="add del mod modGraphic">
+          <ac:chgData name="Thorsten Hilbradt" userId="b76ca37a-0758-4f71-aeb6-b277b8bbbfdd" providerId="ADAL" clId="{E7A5B079-1BA6-4760-B851-727E3DF33BC4}" dt="2020-05-31T22:41:10.533" v="1351" actId="478"/>
+          <ac:graphicFrameMkLst>
+            <pc:docMk/>
+            <pc:sldMk cId="3503204803" sldId="263"/>
+            <ac:graphicFrameMk id="6" creationId="{91314279-5659-49E8-9605-1755E1DB8672}"/>
+          </ac:graphicFrameMkLst>
+        </pc:graphicFrameChg>
+        <pc:graphicFrameChg chg="add del modGraphic">
+          <ac:chgData name="Thorsten Hilbradt" userId="b76ca37a-0758-4f71-aeb6-b277b8bbbfdd" providerId="ADAL" clId="{E7A5B079-1BA6-4760-B851-727E3DF33BC4}" dt="2020-05-31T22:40:52.792" v="1350" actId="478"/>
+          <ac:graphicFrameMkLst>
+            <pc:docMk/>
+            <pc:sldMk cId="3503204803" sldId="263"/>
+            <ac:graphicFrameMk id="8" creationId="{48C6780C-C0D2-4C6A-87B0-4A19EB70D5C0}"/>
+          </ac:graphicFrameMkLst>
+        </pc:graphicFrameChg>
         <pc:picChg chg="add del">
           <ac:chgData name="Thorsten Hilbradt" userId="b76ca37a-0758-4f71-aeb6-b277b8bbbfdd" providerId="ADAL" clId="{E7A5B079-1BA6-4760-B851-727E3DF33BC4}" dt="2020-05-29T10:16:54.484" v="62" actId="26606"/>
           <ac:picMkLst>
@@ -1994,7 +2061,7 @@
         </pc:sldMkLst>
       </pc:sldChg>
       <pc:sldChg chg="addSp delSp modSp add mod setBg">
-        <pc:chgData name="Thorsten Hilbradt" userId="b76ca37a-0758-4f71-aeb6-b277b8bbbfdd" providerId="ADAL" clId="{E7A5B079-1BA6-4760-B851-727E3DF33BC4}" dt="2020-05-31T22:22:25.867" v="1203" actId="26606"/>
+        <pc:chgData name="Thorsten Hilbradt" userId="b76ca37a-0758-4f71-aeb6-b277b8bbbfdd" providerId="ADAL" clId="{E7A5B079-1BA6-4760-B851-727E3DF33BC4}" dt="2020-05-31T22:31:15.310" v="1344" actId="1076"/>
         <pc:sldMkLst>
           <pc:docMk/>
           <pc:sldMk cId="3860202698" sldId="271"/>
@@ -2005,6 +2072,14 @@
             <pc:docMk/>
             <pc:sldMk cId="3860202698" sldId="271"/>
             <ac:spMk id="2" creationId="{34F6631A-0EE3-412E-AE60-1CFC492D3819}"/>
+          </ac:spMkLst>
+        </pc:spChg>
+        <pc:spChg chg="add mod">
+          <ac:chgData name="Thorsten Hilbradt" userId="b76ca37a-0758-4f71-aeb6-b277b8bbbfdd" providerId="ADAL" clId="{E7A5B079-1BA6-4760-B851-727E3DF33BC4}" dt="2020-05-31T22:31:15.310" v="1344" actId="1076"/>
+          <ac:spMkLst>
+            <pc:docMk/>
+            <pc:sldMk cId="3860202698" sldId="271"/>
+            <ac:spMk id="3" creationId="{23044B2E-58F0-4039-8E9D-B10FC5A59DB5}"/>
           </ac:spMkLst>
         </pc:spChg>
         <pc:spChg chg="del">
@@ -5474,7 +5549,7 @@
           <a:p>
             <a:fld id="{EC23A34E-68F0-4489-A79F-CD1755C002C0}" type="datetimeFigureOut">
               <a:rPr lang="de-DE" smtClean="0"/>
-              <a:t>31.05.2020</a:t>
+              <a:t>01.06.2020</a:t>
             </a:fld>
             <a:endParaRPr lang="de-DE"/>
           </a:p>
@@ -5960,9 +6035,9 @@
           <a:bodyPr/>
           <a:lstStyle/>
           <a:p>
-            <a:fld id="{7274FCDF-DB5A-4937-AFDD-46172A037428}" type="datetime1">
+            <a:fld id="{B3DF4E43-3733-40FD-A1D9-AD4B75B26908}" type="datetime1">
               <a:rPr lang="de-DE" smtClean="0"/>
-              <a:t>31.05.2020</a:t>
+              <a:t>01.06.2020</a:t>
             </a:fld>
             <a:endParaRPr lang="de-DE"/>
           </a:p>
@@ -6130,9 +6205,9 @@
           <a:bodyPr/>
           <a:lstStyle/>
           <a:p>
-            <a:fld id="{3125A9F4-B276-4BE8-944F-538609C5789E}" type="datetime1">
+            <a:fld id="{452CD2C4-1B13-44EB-AA07-A4D1A8E2ED7F}" type="datetime1">
               <a:rPr lang="de-DE" smtClean="0"/>
-              <a:t>31.05.2020</a:t>
+              <a:t>01.06.2020</a:t>
             </a:fld>
             <a:endParaRPr lang="de-DE"/>
           </a:p>
@@ -6310,9 +6385,9 @@
           <a:bodyPr/>
           <a:lstStyle/>
           <a:p>
-            <a:fld id="{C0A750BB-54FB-43F4-9E4F-5741A5FF7F3A}" type="datetime1">
+            <a:fld id="{07F7DB5F-C024-4C0B-A90D-1C2EEC4374EB}" type="datetime1">
               <a:rPr lang="de-DE" smtClean="0"/>
-              <a:t>31.05.2020</a:t>
+              <a:t>01.06.2020</a:t>
             </a:fld>
             <a:endParaRPr lang="de-DE"/>
           </a:p>
@@ -6480,9 +6555,9 @@
           <a:bodyPr/>
           <a:lstStyle/>
           <a:p>
-            <a:fld id="{3046D782-B936-43A6-A435-D03A438B36D4}" type="datetime1">
+            <a:fld id="{E708DCF5-D670-4C31-AEF1-850D4235FD4B}" type="datetime1">
               <a:rPr lang="de-DE" smtClean="0"/>
-              <a:t>31.05.2020</a:t>
+              <a:t>01.06.2020</a:t>
             </a:fld>
             <a:endParaRPr lang="de-DE"/>
           </a:p>
@@ -6726,9 +6801,9 @@
           <a:bodyPr/>
           <a:lstStyle/>
           <a:p>
-            <a:fld id="{923A3FE6-3BEB-438B-8C2D-D782033BF854}" type="datetime1">
+            <a:fld id="{BED56DEB-F291-4F9C-ACA1-0B6DABBF863B}" type="datetime1">
               <a:rPr lang="de-DE" smtClean="0"/>
-              <a:t>31.05.2020</a:t>
+              <a:t>01.06.2020</a:t>
             </a:fld>
             <a:endParaRPr lang="de-DE"/>
           </a:p>
@@ -6958,9 +7033,9 @@
           <a:bodyPr/>
           <a:lstStyle/>
           <a:p>
-            <a:fld id="{150B4A5C-3457-4770-8CFE-2E265CC58C69}" type="datetime1">
+            <a:fld id="{159025B1-E81C-44CF-AD44-E9FAFA2544FD}" type="datetime1">
               <a:rPr lang="de-DE" smtClean="0"/>
-              <a:t>31.05.2020</a:t>
+              <a:t>01.06.2020</a:t>
             </a:fld>
             <a:endParaRPr lang="de-DE"/>
           </a:p>
@@ -7325,9 +7400,9 @@
           <a:bodyPr/>
           <a:lstStyle/>
           <a:p>
-            <a:fld id="{AF7890AA-D97D-4D18-BA74-AC63CCF42475}" type="datetime1">
+            <a:fld id="{1CEE494A-F2E9-4F64-92C4-2135C39843F8}" type="datetime1">
               <a:rPr lang="de-DE" smtClean="0"/>
-              <a:t>31.05.2020</a:t>
+              <a:t>01.06.2020</a:t>
             </a:fld>
             <a:endParaRPr lang="de-DE"/>
           </a:p>
@@ -7443,9 +7518,9 @@
           <a:bodyPr/>
           <a:lstStyle/>
           <a:p>
-            <a:fld id="{76DECC9E-09AA-4DC9-AE13-A132AF68154C}" type="datetime1">
+            <a:fld id="{FC23396A-A564-4B2A-AFD7-1708A33F3AE0}" type="datetime1">
               <a:rPr lang="de-DE" smtClean="0"/>
-              <a:t>31.05.2020</a:t>
+              <a:t>01.06.2020</a:t>
             </a:fld>
             <a:endParaRPr lang="de-DE"/>
           </a:p>
@@ -7538,9 +7613,9 @@
           <a:bodyPr/>
           <a:lstStyle/>
           <a:p>
-            <a:fld id="{A9DEFCBE-7915-4B11-924B-716072F60B95}" type="datetime1">
+            <a:fld id="{AEE49A08-2FDF-49E2-89E7-744A8E4CF142}" type="datetime1">
               <a:rPr lang="de-DE" smtClean="0"/>
-              <a:t>31.05.2020</a:t>
+              <a:t>01.06.2020</a:t>
             </a:fld>
             <a:endParaRPr lang="de-DE"/>
           </a:p>
@@ -7815,9 +7890,9 @@
           <a:bodyPr/>
           <a:lstStyle/>
           <a:p>
-            <a:fld id="{E06F06F5-9E83-4BFD-95A9-4C55A14ED18E}" type="datetime1">
+            <a:fld id="{68A9B00C-BF7E-4714-984D-1CF5F0AB4A28}" type="datetime1">
               <a:rPr lang="de-DE" smtClean="0"/>
-              <a:t>31.05.2020</a:t>
+              <a:t>01.06.2020</a:t>
             </a:fld>
             <a:endParaRPr lang="de-DE"/>
           </a:p>
@@ -8072,9 +8147,9 @@
           <a:bodyPr/>
           <a:lstStyle/>
           <a:p>
-            <a:fld id="{FF4BEB5C-CBE6-45A3-8D57-7F62FA7573AC}" type="datetime1">
+            <a:fld id="{71791F12-72EB-4469-A882-0EE79FD2D23F}" type="datetime1">
               <a:rPr lang="de-DE" smtClean="0"/>
-              <a:t>31.05.2020</a:t>
+              <a:t>01.06.2020</a:t>
             </a:fld>
             <a:endParaRPr lang="de-DE"/>
           </a:p>
@@ -8285,9 +8360,9 @@
             </a:lvl1pPr>
           </a:lstStyle>
           <a:p>
-            <a:fld id="{87BABDF2-F3C5-4AC0-9DA9-0726FEA9F971}" type="datetime1">
+            <a:fld id="{C0D82272-7DA6-4C57-8D6A-4851730FC5F3}" type="datetime1">
               <a:rPr lang="de-DE" smtClean="0"/>
-              <a:t>31.05.2020</a:t>
+              <a:t>01.06.2020</a:t>
             </a:fld>
             <a:endParaRPr lang="de-DE"/>
           </a:p>
@@ -9580,8 +9655,85 @@
                   <a:srgbClr val="080808"/>
                 </a:solidFill>
               </a:rPr>
-              <a:t>Der neue Weg Schach zu spielen</a:t>
+              <a:t>A </a:t>
             </a:r>
+            <a:r>
+              <a:rPr lang="de-DE" sz="2000" dirty="0" err="1">
+                <a:solidFill>
+                  <a:srgbClr val="080808"/>
+                </a:solidFill>
+              </a:rPr>
+              <a:t>new</a:t>
+            </a:r>
+            <a:r>
+              <a:rPr lang="de-DE" sz="2000" dirty="0">
+                <a:solidFill>
+                  <a:srgbClr val="080808"/>
+                </a:solidFill>
+              </a:rPr>
+              <a:t> </a:t>
+            </a:r>
+            <a:r>
+              <a:rPr lang="de-DE" sz="2000" dirty="0" err="1">
+                <a:solidFill>
+                  <a:srgbClr val="080808"/>
+                </a:solidFill>
+              </a:rPr>
+              <a:t>way</a:t>
+            </a:r>
+            <a:r>
+              <a:rPr lang="de-DE" sz="2000" dirty="0">
+                <a:solidFill>
+                  <a:srgbClr val="080808"/>
+                </a:solidFill>
+              </a:rPr>
+              <a:t> </a:t>
+            </a:r>
+            <a:r>
+              <a:rPr lang="de-DE" sz="2000" dirty="0" err="1">
+                <a:solidFill>
+                  <a:srgbClr val="080808"/>
+                </a:solidFill>
+              </a:rPr>
+              <a:t>to</a:t>
+            </a:r>
+            <a:r>
+              <a:rPr lang="de-DE" sz="2000" dirty="0">
+                <a:solidFill>
+                  <a:srgbClr val="080808"/>
+                </a:solidFill>
+              </a:rPr>
+              <a:t> </a:t>
+            </a:r>
+            <a:r>
+              <a:rPr lang="de-DE" sz="2000" dirty="0" err="1">
+                <a:solidFill>
+                  <a:srgbClr val="080808"/>
+                </a:solidFill>
+              </a:rPr>
+              <a:t>play</a:t>
+            </a:r>
+            <a:r>
+              <a:rPr lang="de-DE" sz="2000" dirty="0">
+                <a:solidFill>
+                  <a:srgbClr val="080808"/>
+                </a:solidFill>
+              </a:rPr>
+              <a:t> </a:t>
+            </a:r>
+            <a:r>
+              <a:rPr lang="de-DE" sz="2000" dirty="0" err="1">
+                <a:solidFill>
+                  <a:srgbClr val="080808"/>
+                </a:solidFill>
+              </a:rPr>
+              <a:t>chess</a:t>
+            </a:r>
+            <a:endParaRPr lang="de-DE" sz="2000" dirty="0">
+              <a:solidFill>
+                <a:srgbClr val="080808"/>
+              </a:solidFill>
+            </a:endParaRPr>
           </a:p>
         </p:txBody>
       </p:sp>
@@ -14103,6 +14255,45 @@
           </a:p>
         </p:txBody>
       </p:sp>
+      <p:sp>
+        <p:nvSpPr>
+          <p:cNvPr id="3" name="Textfeld 2">
+            <a:extLst>
+              <a:ext uri="{FF2B5EF4-FFF2-40B4-BE49-F238E27FC236}">
+                <a16:creationId xmlns:a16="http://schemas.microsoft.com/office/drawing/2014/main" id="{23044B2E-58F0-4039-8E9D-B10FC5A59DB5}"/>
+              </a:ext>
+            </a:extLst>
+          </p:cNvPr>
+          <p:cNvSpPr txBox="1"/>
+          <p:nvPr/>
+        </p:nvSpPr>
+        <p:spPr>
+          <a:xfrm>
+            <a:off x="5633483" y="1859309"/>
+            <a:ext cx="925033" cy="200055"/>
+          </a:xfrm>
+          <a:prstGeom prst="rect">
+            <a:avLst/>
+          </a:prstGeom>
+          <a:noFill/>
+        </p:spPr>
+        <p:txBody>
+          <a:bodyPr wrap="square" rtlCol="0">
+            <a:spAutoFit/>
+          </a:bodyPr>
+          <a:lstStyle/>
+          <a:p>
+            <a:r>
+              <a:rPr lang="de-DE" sz="700" dirty="0">
+                <a:solidFill>
+                  <a:schemeClr val="bg1"/>
+                </a:solidFill>
+              </a:rPr>
+              <a:t>Killroy jr. Was here</a:t>
+            </a:r>
+          </a:p>
+        </p:txBody>
+      </p:sp>
     </p:spTree>
     <p:extLst>
       <p:ext uri="{BB962C8B-B14F-4D97-AF65-F5344CB8AC3E}">
@@ -15289,7 +15480,7 @@
           <a:p>
             <a:pPr algn="ctr"/>
             <a:r>
-              <a:rPr lang="en-US" sz="3600" kern="1200">
+              <a:rPr lang="en-US" sz="3600" kern="1200" dirty="0">
                 <a:solidFill>
                   <a:srgbClr val="080808"/>
                 </a:solidFill>
@@ -20337,6 +20528,21 @@
 </file>
 
 <file path=customXml/item1.xml><?xml version="1.0" encoding="utf-8"?>
+<p:properties xmlns:p="http://schemas.microsoft.com/office/2006/metadata/properties" xmlns:xsi="http://www.w3.org/2001/XMLSchema-instance" xmlns:pc="http://schemas.microsoft.com/office/infopath/2007/PartnerControls">
+  <documentManagement/>
+</p:properties>
+</file>
+
+<file path=customXml/item2.xml><?xml version="1.0" encoding="utf-8"?>
+<?mso-contentType ?>
+<FormTemplates xmlns="http://schemas.microsoft.com/sharepoint/v3/contenttype/forms">
+  <Display>DocumentLibraryForm</Display>
+  <Edit>DocumentLibraryForm</Edit>
+  <New>DocumentLibraryForm</New>
+</FormTemplates>
+</file>
+
+<file path=customXml/item3.xml><?xml version="1.0" encoding="utf-8"?>
 <ct:contentTypeSchema xmlns:ct="http://schemas.microsoft.com/office/2006/metadata/contentType" xmlns:ma="http://schemas.microsoft.com/office/2006/metadata/properties/metaAttributes" ct:_="" ma:_="" ma:contentTypeName="Dokument" ma:contentTypeID="0x0101006053BFF7913E914E8633705294D786E0" ma:contentTypeVersion="12" ma:contentTypeDescription="Ein neues Dokument erstellen." ma:contentTypeScope="" ma:versionID="292c63051bcc76f3c0ba6d3d005fc720">
   <xsd:schema xmlns:xsd="http://www.w3.org/2001/XMLSchema" xmlns:xs="http://www.w3.org/2001/XMLSchema" xmlns:p="http://schemas.microsoft.com/office/2006/metadata/properties" xmlns:ns3="428a2bfe-bcaf-43de-8bea-075e4c45d2d0" xmlns:ns4="19353dae-2197-414d-a888-862b93af9487" targetNamespace="http://schemas.microsoft.com/office/2006/metadata/properties" ma:root="true" ma:fieldsID="1ef18051d54d654b75909a1fce9ac096" ns3:_="" ns4:_="">
     <xsd:import namespace="428a2bfe-bcaf-43de-8bea-075e4c45d2d0"/>
@@ -20553,22 +20759,32 @@
 </ct:contentTypeSchema>
 </file>
 
-<file path=customXml/item2.xml><?xml version="1.0" encoding="utf-8"?>
-<?mso-contentType ?>
-<FormTemplates xmlns="http://schemas.microsoft.com/sharepoint/v3/contenttype/forms">
-  <Display>DocumentLibraryForm</Display>
-  <Edit>DocumentLibraryForm</Edit>
-  <New>DocumentLibraryForm</New>
-</FormTemplates>
+<file path=customXml/itemProps1.xml><?xml version="1.0" encoding="utf-8"?>
+<ds:datastoreItem xmlns:ds="http://schemas.openxmlformats.org/officeDocument/2006/customXml" ds:itemID="{3F8C196F-57CA-4A27-A0C5-E15A158BF523}">
+  <ds:schemaRefs>
+    <ds:schemaRef ds:uri="428a2bfe-bcaf-43de-8bea-075e4c45d2d0"/>
+    <ds:schemaRef ds:uri="http://purl.org/dc/terms/"/>
+    <ds:schemaRef ds:uri="http://schemas.openxmlformats.org/package/2006/metadata/core-properties"/>
+    <ds:schemaRef ds:uri="http://schemas.microsoft.com/office/2006/documentManagement/types"/>
+    <ds:schemaRef ds:uri="19353dae-2197-414d-a888-862b93af9487"/>
+    <ds:schemaRef ds:uri="http://purl.org/dc/elements/1.1/"/>
+    <ds:schemaRef ds:uri="http://schemas.microsoft.com/office/2006/metadata/properties"/>
+    <ds:schemaRef ds:uri="http://schemas.microsoft.com/office/infopath/2007/PartnerControls"/>
+    <ds:schemaRef ds:uri="http://www.w3.org/XML/1998/namespace"/>
+    <ds:schemaRef ds:uri="http://purl.org/dc/dcmitype/"/>
+  </ds:schemaRefs>
+</ds:datastoreItem>
 </file>
 
-<file path=customXml/item3.xml><?xml version="1.0" encoding="utf-8"?>
-<p:properties xmlns:p="http://schemas.microsoft.com/office/2006/metadata/properties" xmlns:xsi="http://www.w3.org/2001/XMLSchema-instance" xmlns:pc="http://schemas.microsoft.com/office/infopath/2007/PartnerControls">
-  <documentManagement/>
-</p:properties>
+<file path=customXml/itemProps2.xml><?xml version="1.0" encoding="utf-8"?>
+<ds:datastoreItem xmlns:ds="http://schemas.openxmlformats.org/officeDocument/2006/customXml" ds:itemID="{1676AEB8-5320-4F07-868F-E91141D86E7B}">
+  <ds:schemaRefs>
+    <ds:schemaRef ds:uri="http://schemas.microsoft.com/sharepoint/v3/contenttype/forms"/>
+  </ds:schemaRefs>
+</ds:datastoreItem>
 </file>
 
-<file path=customXml/itemProps1.xml><?xml version="1.0" encoding="utf-8"?>
+<file path=customXml/itemProps3.xml><?xml version="1.0" encoding="utf-8"?>
 <ds:datastoreItem xmlns:ds="http://schemas.openxmlformats.org/officeDocument/2006/customXml" ds:itemID="{7623EEBE-3AFD-45F2-B13A-22C0717EE2AE}">
   <ds:schemaRefs>
     <ds:schemaRef ds:uri="http://schemas.microsoft.com/office/2006/metadata/contentType"/>
@@ -20585,29 +20801,4 @@
     <ds:schemaRef ds:uri="http://schemas.microsoft.com/internal/obd"/>
   </ds:schemaRefs>
 </ds:datastoreItem>
-</file>
-
-<file path=customXml/itemProps2.xml><?xml version="1.0" encoding="utf-8"?>
-<ds:datastoreItem xmlns:ds="http://schemas.openxmlformats.org/officeDocument/2006/customXml" ds:itemID="{1676AEB8-5320-4F07-868F-E91141D86E7B}">
-  <ds:schemaRefs>
-    <ds:schemaRef ds:uri="http://schemas.microsoft.com/sharepoint/v3/contenttype/forms"/>
-  </ds:schemaRefs>
-</ds:datastoreItem>
-</file>
-
-<file path=customXml/itemProps3.xml><?xml version="1.0" encoding="utf-8"?>
-<ds:datastoreItem xmlns:ds="http://schemas.openxmlformats.org/officeDocument/2006/customXml" ds:itemID="{3F8C196F-57CA-4A27-A0C5-E15A158BF523}">
-  <ds:schemaRefs>
-    <ds:schemaRef ds:uri="http://schemas.microsoft.com/office/2006/documentManagement/types"/>
-    <ds:schemaRef ds:uri="19353dae-2197-414d-a888-862b93af9487"/>
-    <ds:schemaRef ds:uri="http://purl.org/dc/elements/1.1/"/>
-    <ds:schemaRef ds:uri="http://schemas.microsoft.com/office/2006/metadata/properties"/>
-    <ds:schemaRef ds:uri="428a2bfe-bcaf-43de-8bea-075e4c45d2d0"/>
-    <ds:schemaRef ds:uri="http://purl.org/dc/terms/"/>
-    <ds:schemaRef ds:uri="http://schemas.openxmlformats.org/package/2006/metadata/core-properties"/>
-    <ds:schemaRef ds:uri="http://schemas.microsoft.com/office/infopath/2007/PartnerControls"/>
-    <ds:schemaRef ds:uri="http://www.w3.org/XML/1998/namespace"/>
-    <ds:schemaRef ds:uri="http://purl.org/dc/dcmitype/"/>
-  </ds:schemaRefs>
-</ds:datastoreItem>
 </file>
</xml_diff>